<commit_message>
Minor Fixes and export to PDF
</commit_message>
<xml_diff>
--- a/Praesentation/Präsentation_Final_Final.pptx
+++ b/Praesentation/Präsentation_Final_Final.pptx
@@ -258,6 +258,11 @@
       </a:defRPr>
     </a:lvl9pPr>
   </p:defaultTextStyle>
+  <p:extLst>
+    <p:ext uri="{EFAFB233-063F-42B5-8137-9DF3F51BA10A}">
+      <p15:sldGuideLst xmlns:p15="http://schemas.microsoft.com/office/powerpoint/2012/main"/>
+    </p:ext>
+  </p:extLst>
 </p:presentation>
 </file>
 
@@ -280,7 +285,7 @@
   <pc:docChgLst>
     <pc:chgData name="Tim Böckel" userId="139bf3991ca47324" providerId="LiveId" clId="{32E47A08-676B-44E4-8207-674848184F59}"/>
     <pc:docChg chg="undo custSel modSld">
-      <pc:chgData name="Tim Böckel" userId="139bf3991ca47324" providerId="LiveId" clId="{32E47A08-676B-44E4-8207-674848184F59}" dt="2021-06-08T08:07:08.489" v="110" actId="2711"/>
+      <pc:chgData name="Tim Böckel" userId="139bf3991ca47324" providerId="LiveId" clId="{32E47A08-676B-44E4-8207-674848184F59}" dt="2021-06-08T08:10:02.750" v="124" actId="20577"/>
       <pc:docMkLst>
         <pc:docMk/>
       </pc:docMkLst>
@@ -364,6 +369,21 @@
             <pc:docMk/>
             <pc:sldMk cId="0" sldId="266"/>
             <ac:spMk id="6" creationId="{A14702C6-C421-4710-86E2-31366BA58165}"/>
+          </ac:spMkLst>
+        </pc:spChg>
+      </pc:sldChg>
+      <pc:sldChg chg="modSp mod">
+        <pc:chgData name="Tim Böckel" userId="139bf3991ca47324" providerId="LiveId" clId="{32E47A08-676B-44E4-8207-674848184F59}" dt="2021-06-08T08:10:02.750" v="124" actId="20577"/>
+        <pc:sldMkLst>
+          <pc:docMk/>
+          <pc:sldMk cId="0" sldId="268"/>
+        </pc:sldMkLst>
+        <pc:spChg chg="mod">
+          <ac:chgData name="Tim Böckel" userId="139bf3991ca47324" providerId="LiveId" clId="{32E47A08-676B-44E4-8207-674848184F59}" dt="2021-06-08T08:10:02.750" v="124" actId="20577"/>
+          <ac:spMkLst>
+            <pc:docMk/>
+            <pc:sldMk cId="0" sldId="268"/>
+            <ac:spMk id="195" creationId="{00000000-0000-0000-0000-000000000000}"/>
           </ac:spMkLst>
         </pc:spChg>
       </pc:sldChg>
@@ -16579,7 +16599,7 @@
               <a:buChar char="•"/>
             </a:pPr>
             <a:r>
-              <a:rPr lang="de-DE" sz="2000">
+              <a:rPr lang="de-DE" sz="2000" dirty="0">
                 <a:latin typeface="Arial"/>
                 <a:ea typeface="Arial"/>
                 <a:cs typeface="Arial"/>
@@ -16587,7 +16607,7 @@
               </a:rPr>
               <a:t>Kundengetriebener Designprozess</a:t>
             </a:r>
-            <a:endParaRPr/>
+            <a:endParaRPr dirty="0"/>
           </a:p>
           <a:p>
             <a:pPr marL="228600" lvl="0" indent="-228600" algn="l" rtl="0">
@@ -16607,7 +16627,7 @@
               <a:buChar char="•"/>
             </a:pPr>
             <a:r>
-              <a:rPr lang="de-DE" sz="2000">
+              <a:rPr lang="de-DE" sz="2000" dirty="0">
                 <a:latin typeface="Arial"/>
                 <a:ea typeface="Arial"/>
                 <a:cs typeface="Arial"/>
@@ -16615,7 +16635,7 @@
               </a:rPr>
               <a:t>Sehr flexibel einsetzbar</a:t>
             </a:r>
-            <a:endParaRPr/>
+            <a:endParaRPr dirty="0"/>
           </a:p>
           <a:p>
             <a:pPr marL="228600" lvl="0" indent="-228600" algn="l" rtl="0">
@@ -16635,7 +16655,7 @@
               <a:buChar char="•"/>
             </a:pPr>
             <a:r>
-              <a:rPr lang="de-DE" sz="2000">
+              <a:rPr lang="de-DE" sz="2000" dirty="0">
                 <a:latin typeface="Arial"/>
                 <a:ea typeface="Arial"/>
                 <a:cs typeface="Arial"/>
@@ -16643,7 +16663,7 @@
               </a:rPr>
               <a:t>CJMs ermöglichen ein besseres Verständnis für die Komplexität des Produkt-Ökosystems</a:t>
             </a:r>
-            <a:endParaRPr/>
+            <a:endParaRPr dirty="0"/>
           </a:p>
           <a:p>
             <a:pPr marL="228600" lvl="0" indent="-228600" algn="l" rtl="0">
@@ -16663,15 +16683,15 @@
               <a:buChar char="•"/>
             </a:pPr>
             <a:r>
-              <a:rPr lang="de-DE" sz="2000">
+              <a:rPr lang="de-DE" sz="2000" dirty="0">
                 <a:latin typeface="Arial"/>
                 <a:ea typeface="Arial"/>
                 <a:cs typeface="Arial"/>
                 <a:sym typeface="Arial"/>
               </a:rPr>
-              <a:t>Durch die Einbeziehung der Emotionen und Denkprozesse der tatsächlichen Kunden kann die Analyse über die übliche Analyse quantitativer Daten hinausgehen</a:t>
+              <a:t>Durch die Einbeziehung der Emotionen und Denkprozesse der tatsächlichen Kunden kann die Interpretation über die übliche Analyse quantitativer Daten hinausgehen</a:t>
             </a:r>
-            <a:endParaRPr/>
+            <a:endParaRPr dirty="0"/>
           </a:p>
         </p:txBody>
       </p:sp>

</xml_diff>